<commit_message>
Documentation updated ppsx demonstration files excluded
</commit_message>
<xml_diff>
--- a/Documentation/coursation.pptx
+++ b/Documentation/coursation.pptx
@@ -325,7 +325,7 @@
           <a:p>
             <a:fld id="{3E90B7E1-6EE8-4E7F-AB25-47B34B1E57AE}" type="datetimeFigureOut">
               <a:rPr lang="ru-RU" smtClean="0"/>
-              <a:t>2013.02.26</a:t>
+              <a:t>2013.03.14</a:t>
             </a:fld>
             <a:endParaRPr lang="ru-RU"/>
           </a:p>
@@ -495,7 +495,7 @@
           <a:p>
             <a:fld id="{3E90B7E1-6EE8-4E7F-AB25-47B34B1E57AE}" type="datetimeFigureOut">
               <a:rPr lang="ru-RU" smtClean="0"/>
-              <a:t>2013.02.26</a:t>
+              <a:t>2013.03.14</a:t>
             </a:fld>
             <a:endParaRPr lang="ru-RU"/>
           </a:p>
@@ -675,7 +675,7 @@
           <a:p>
             <a:fld id="{3E90B7E1-6EE8-4E7F-AB25-47B34B1E57AE}" type="datetimeFigureOut">
               <a:rPr lang="ru-RU" smtClean="0"/>
-              <a:t>2013.02.26</a:t>
+              <a:t>2013.03.14</a:t>
             </a:fld>
             <a:endParaRPr lang="ru-RU"/>
           </a:p>
@@ -845,7 +845,7 @@
           <a:p>
             <a:fld id="{3E90B7E1-6EE8-4E7F-AB25-47B34B1E57AE}" type="datetimeFigureOut">
               <a:rPr lang="ru-RU" smtClean="0"/>
-              <a:t>2013.02.26</a:t>
+              <a:t>2013.03.14</a:t>
             </a:fld>
             <a:endParaRPr lang="ru-RU"/>
           </a:p>
@@ -1091,7 +1091,7 @@
           <a:p>
             <a:fld id="{3E90B7E1-6EE8-4E7F-AB25-47B34B1E57AE}" type="datetimeFigureOut">
               <a:rPr lang="ru-RU" smtClean="0"/>
-              <a:t>2013.02.26</a:t>
+              <a:t>2013.03.14</a:t>
             </a:fld>
             <a:endParaRPr lang="ru-RU"/>
           </a:p>
@@ -1379,7 +1379,7 @@
           <a:p>
             <a:fld id="{3E90B7E1-6EE8-4E7F-AB25-47B34B1E57AE}" type="datetimeFigureOut">
               <a:rPr lang="ru-RU" smtClean="0"/>
-              <a:t>2013.02.26</a:t>
+              <a:t>2013.03.14</a:t>
             </a:fld>
             <a:endParaRPr lang="ru-RU"/>
           </a:p>
@@ -1801,7 +1801,7 @@
           <a:p>
             <a:fld id="{3E90B7E1-6EE8-4E7F-AB25-47B34B1E57AE}" type="datetimeFigureOut">
               <a:rPr lang="ru-RU" smtClean="0"/>
-              <a:t>2013.02.26</a:t>
+              <a:t>2013.03.14</a:t>
             </a:fld>
             <a:endParaRPr lang="ru-RU"/>
           </a:p>
@@ -1919,7 +1919,7 @@
           <a:p>
             <a:fld id="{3E90B7E1-6EE8-4E7F-AB25-47B34B1E57AE}" type="datetimeFigureOut">
               <a:rPr lang="ru-RU" smtClean="0"/>
-              <a:t>2013.02.26</a:t>
+              <a:t>2013.03.14</a:t>
             </a:fld>
             <a:endParaRPr lang="ru-RU"/>
           </a:p>
@@ -2014,7 +2014,7 @@
           <a:p>
             <a:fld id="{3E90B7E1-6EE8-4E7F-AB25-47B34B1E57AE}" type="datetimeFigureOut">
               <a:rPr lang="ru-RU" smtClean="0"/>
-              <a:t>2013.02.26</a:t>
+              <a:t>2013.03.14</a:t>
             </a:fld>
             <a:endParaRPr lang="ru-RU"/>
           </a:p>
@@ -2291,7 +2291,7 @@
           <a:p>
             <a:fld id="{3E90B7E1-6EE8-4E7F-AB25-47B34B1E57AE}" type="datetimeFigureOut">
               <a:rPr lang="ru-RU" smtClean="0"/>
-              <a:t>2013.02.26</a:t>
+              <a:t>2013.03.14</a:t>
             </a:fld>
             <a:endParaRPr lang="ru-RU"/>
           </a:p>
@@ -2544,7 +2544,7 @@
           <a:p>
             <a:fld id="{3E90B7E1-6EE8-4E7F-AB25-47B34B1E57AE}" type="datetimeFigureOut">
               <a:rPr lang="ru-RU" smtClean="0"/>
-              <a:t>2013.02.26</a:t>
+              <a:t>2013.03.14</a:t>
             </a:fld>
             <a:endParaRPr lang="ru-RU"/>
           </a:p>
@@ -2757,7 +2757,7 @@
           <a:p>
             <a:fld id="{3E90B7E1-6EE8-4E7F-AB25-47B34B1E57AE}" type="datetimeFigureOut">
               <a:rPr lang="ru-RU" smtClean="0"/>
-              <a:t>2013.02.26</a:t>
+              <a:t>2013.03.14</a:t>
             </a:fld>
             <a:endParaRPr lang="ru-RU"/>
           </a:p>
@@ -6196,7 +6196,7 @@
         </p:blipFill>
         <p:spPr bwMode="auto">
           <a:xfrm>
-            <a:off x="899592" y="2276872"/>
+            <a:off x="923975" y="2276872"/>
             <a:ext cx="457200" cy="457200"/>
           </a:xfrm>
           <a:prstGeom prst="rect">
@@ -7830,6 +7830,15 @@
         <p:blipFill>
           <a:blip r:embed="rId2">
             <a:extLst>
+              <a:ext uri="{BEBA8EAE-BF5A-486C-A8C5-ECC9F3942E4B}">
+                <a14:imgProps xmlns:a14="http://schemas.microsoft.com/office/drawing/2010/main">
+                  <a14:imgLayer r:embed="rId3">
+                    <a14:imgEffect>
+                      <a14:saturation sat="33000"/>
+                    </a14:imgEffect>
+                  </a14:imgLayer>
+                </a14:imgProps>
+              </a:ext>
               <a:ext uri="{28A0092B-C50C-407E-A947-70E740481C1C}">
                 <a14:useLocalDpi xmlns:a14="http://schemas.microsoft.com/office/drawing/2010/main" val="0"/>
               </a:ext>
@@ -7871,11 +7880,11 @@
           </p:nvPr>
         </p:nvPicPr>
         <p:blipFill>
-          <a:blip r:embed="rId3">
+          <a:blip r:embed="rId4">
             <a:extLst>
               <a:ext uri="{BEBA8EAE-BF5A-486C-A8C5-ECC9F3942E4B}">
                 <a14:imgProps xmlns:a14="http://schemas.microsoft.com/office/drawing/2010/main">
-                  <a14:imgLayer r:embed="rId4">
+                  <a14:imgLayer r:embed="rId5">
                     <a14:imgEffect>
                       <a14:saturation sat="33000"/>
                     </a14:imgEffect>
@@ -7894,7 +7903,7 @@
         </p:blipFill>
         <p:spPr bwMode="auto">
           <a:xfrm>
-            <a:off x="2843808" y="188640"/>
+            <a:off x="2699792" y="728700"/>
             <a:ext cx="6142225" cy="4968552"/>
           </a:xfrm>
           <a:prstGeom prst="rect">
@@ -7921,11 +7930,11 @@
           <p:nvPr/>
         </p:nvPicPr>
         <p:blipFill>
-          <a:blip r:embed="rId5">
+          <a:blip r:embed="rId6">
             <a:extLst>
               <a:ext uri="{BEBA8EAE-BF5A-486C-A8C5-ECC9F3942E4B}">
                 <a14:imgProps xmlns:a14="http://schemas.microsoft.com/office/drawing/2010/main">
-                  <a14:imgLayer r:embed="rId6">
+                  <a14:imgLayer r:embed="rId7">
                     <a14:imgEffect>
                       <a14:saturation sat="33000"/>
                     </a14:imgEffect>

</xml_diff>